<commit_message>
modified:   .DS_Store 	modified:   Figuras/.DS_Store 	new file:   GdP_Rais_Bruno_I.pdf 	modified:   Workflow.pptx 	modified:   charter.pdf 	modified:   charter.tex
</commit_message>
<xml_diff>
--- a/Workflow.pptx
+++ b/Workflow.pptx
@@ -7,6 +7,7 @@
   <p:sldIdLst>
     <p:sldId id="256" r:id="rId2"/>
     <p:sldId id="257" r:id="rId3"/>
+    <p:sldId id="258" r:id="rId4"/>
   </p:sldIdLst>
   <p:sldSz cx="12192000" cy="6858000"/>
   <p:notesSz cx="6858000" cy="9144000"/>
@@ -3679,15 +3680,7 @@
             <a:pPr algn="ctr"/>
             <a:r>
               <a:rPr lang="es-ES_tradnl" dirty="0"/>
-              <a:t>Modelo de Deep </a:t>
-            </a:r>
-            <a:r>
-              <a:rPr lang="es-ES_tradnl" dirty="0" err="1"/>
-              <a:t>learning</a:t>
-            </a:r>
-            <a:r>
-              <a:rPr lang="es-ES_tradnl" dirty="0"/>
-              <a:t> </a:t>
+              <a:t>Modelo de Deep learning </a:t>
             </a:r>
           </a:p>
         </p:txBody>
@@ -3798,8 +3791,8 @@
         </p:nvSpPr>
         <p:spPr>
           <a:xfrm>
-            <a:off x="8813237" y="1963202"/>
-            <a:ext cx="217154" cy="1714880"/>
+            <a:off x="8813237" y="1990846"/>
+            <a:ext cx="217154" cy="1687236"/>
           </a:xfrm>
           <a:prstGeom prst="rect">
             <a:avLst/>
@@ -4061,10 +4054,772 @@
           </a:p>
         </p:txBody>
       </p:sp>
+      <p:sp>
+        <p:nvSpPr>
+          <p:cNvPr id="24" name="Rectangle 23">
+            <a:extLst>
+              <a:ext uri="{FF2B5EF4-FFF2-40B4-BE49-F238E27FC236}">
+                <a16:creationId xmlns:a16="http://schemas.microsoft.com/office/drawing/2014/main" id="{4D555EFC-8F11-826A-C604-9A5D40A372E1}"/>
+              </a:ext>
+            </a:extLst>
+          </p:cNvPr>
+          <p:cNvSpPr/>
+          <p:nvPr/>
+        </p:nvSpPr>
+        <p:spPr>
+          <a:xfrm>
+            <a:off x="4464069" y="2797673"/>
+            <a:ext cx="760930" cy="185195"/>
+          </a:xfrm>
+          <a:prstGeom prst="rect">
+            <a:avLst/>
+          </a:prstGeom>
+        </p:spPr>
+        <p:style>
+          <a:lnRef idx="2">
+            <a:schemeClr val="accent1">
+              <a:shade val="50000"/>
+            </a:schemeClr>
+          </a:lnRef>
+          <a:fillRef idx="1">
+            <a:schemeClr val="accent1"/>
+          </a:fillRef>
+          <a:effectRef idx="0">
+            <a:schemeClr val="accent1"/>
+          </a:effectRef>
+          <a:fontRef idx="minor">
+            <a:schemeClr val="lt1"/>
+          </a:fontRef>
+        </p:style>
+        <p:txBody>
+          <a:bodyPr rtlCol="0" anchor="ctr"/>
+          <a:lstStyle/>
+          <a:p>
+            <a:pPr algn="ctr"/>
+            <a:endParaRPr lang="en-AR"/>
+          </a:p>
+        </p:txBody>
+      </p:sp>
+      <p:sp>
+        <p:nvSpPr>
+          <p:cNvPr id="25" name="TextBox 24">
+            <a:extLst>
+              <a:ext uri="{FF2B5EF4-FFF2-40B4-BE49-F238E27FC236}">
+                <a16:creationId xmlns:a16="http://schemas.microsoft.com/office/drawing/2014/main" id="{1B38C9F6-6AB5-FD85-30C1-AAD93CD4C47C}"/>
+              </a:ext>
+            </a:extLst>
+          </p:cNvPr>
+          <p:cNvSpPr txBox="1"/>
+          <p:nvPr/>
+        </p:nvSpPr>
+        <p:spPr>
+          <a:xfrm>
+            <a:off x="9369217" y="1424306"/>
+            <a:ext cx="1009552" cy="369332"/>
+          </a:xfrm>
+          <a:prstGeom prst="rect">
+            <a:avLst/>
+          </a:prstGeom>
+          <a:noFill/>
+          <a:ln>
+            <a:solidFill>
+              <a:schemeClr val="accent1"/>
+            </a:solidFill>
+          </a:ln>
+        </p:spPr>
+        <p:txBody>
+          <a:bodyPr wrap="square" rtlCol="0">
+            <a:spAutoFit/>
+          </a:bodyPr>
+          <a:lstStyle/>
+          <a:p>
+            <a:pPr algn="ctr"/>
+            <a:r>
+              <a:rPr lang="es-ES_tradnl" dirty="0"/>
+              <a:t>Salida</a:t>
+            </a:r>
+          </a:p>
+        </p:txBody>
+      </p:sp>
+      <p:sp>
+        <p:nvSpPr>
+          <p:cNvPr id="26" name="TextBox 25">
+            <a:extLst>
+              <a:ext uri="{FF2B5EF4-FFF2-40B4-BE49-F238E27FC236}">
+                <a16:creationId xmlns:a16="http://schemas.microsoft.com/office/drawing/2014/main" id="{8169C36E-65F5-4314-0663-BF6166071FFB}"/>
+              </a:ext>
+            </a:extLst>
+          </p:cNvPr>
+          <p:cNvSpPr txBox="1"/>
+          <p:nvPr/>
+        </p:nvSpPr>
+        <p:spPr>
+          <a:xfrm>
+            <a:off x="9277448" y="4290481"/>
+            <a:ext cx="1393599" cy="646331"/>
+          </a:xfrm>
+          <a:prstGeom prst="rect">
+            <a:avLst/>
+          </a:prstGeom>
+          <a:noFill/>
+          <a:ln>
+            <a:solidFill>
+              <a:schemeClr val="accent1"/>
+            </a:solidFill>
+          </a:ln>
+        </p:spPr>
+        <p:txBody>
+          <a:bodyPr wrap="square" rtlCol="0">
+            <a:spAutoFit/>
+          </a:bodyPr>
+          <a:lstStyle/>
+          <a:p>
+            <a:pPr algn="ctr"/>
+            <a:r>
+              <a:rPr lang="es-ES_tradnl" dirty="0"/>
+              <a:t>Salida Predicha</a:t>
+            </a:r>
+          </a:p>
+        </p:txBody>
+      </p:sp>
     </p:spTree>
     <p:extLst>
       <p:ext uri="{BB962C8B-B14F-4D97-AF65-F5344CB8AC3E}">
         <p14:creationId xmlns:p14="http://schemas.microsoft.com/office/powerpoint/2010/main" val="1397341794"/>
+      </p:ext>
+    </p:extLst>
+  </p:cSld>
+  <p:clrMapOvr>
+    <a:masterClrMapping/>
+  </p:clrMapOvr>
+</p:sld>
+</file>
+
+<file path=ppt/slides/slide3.xml><?xml version="1.0" encoding="utf-8"?>
+<p:sld xmlns:a="http://schemas.openxmlformats.org/drawingml/2006/main" xmlns:r="http://schemas.openxmlformats.org/officeDocument/2006/relationships" xmlns:p="http://schemas.openxmlformats.org/presentationml/2006/main">
+  <p:cSld>
+    <p:spTree>
+      <p:nvGrpSpPr>
+        <p:cNvPr id="1" name=""/>
+        <p:cNvGrpSpPr/>
+        <p:nvPr/>
+      </p:nvGrpSpPr>
+      <p:grpSpPr>
+        <a:xfrm>
+          <a:off x="0" y="0"/>
+          <a:ext cx="0" cy="0"/>
+          <a:chOff x="0" y="0"/>
+          <a:chExt cx="0" cy="0"/>
+        </a:xfrm>
+      </p:grpSpPr>
+      <p:sp>
+        <p:nvSpPr>
+          <p:cNvPr id="5" name="TextBox 4">
+            <a:extLst>
+              <a:ext uri="{FF2B5EF4-FFF2-40B4-BE49-F238E27FC236}">
+                <a16:creationId xmlns:a16="http://schemas.microsoft.com/office/drawing/2014/main" id="{443C5A2B-2C68-EEF3-6A8A-DCCC4F724B9D}"/>
+              </a:ext>
+            </a:extLst>
+          </p:cNvPr>
+          <p:cNvSpPr txBox="1"/>
+          <p:nvPr/>
+        </p:nvSpPr>
+        <p:spPr>
+          <a:xfrm>
+            <a:off x="1774830" y="2644170"/>
+            <a:ext cx="1715845" cy="646331"/>
+          </a:xfrm>
+          <a:prstGeom prst="rect">
+            <a:avLst/>
+          </a:prstGeom>
+          <a:noFill/>
+          <a:ln>
+            <a:solidFill>
+              <a:schemeClr val="tx1"/>
+            </a:solidFill>
+          </a:ln>
+        </p:spPr>
+        <p:txBody>
+          <a:bodyPr wrap="square" rtlCol="0">
+            <a:spAutoFit/>
+          </a:bodyPr>
+          <a:lstStyle/>
+          <a:p>
+            <a:pPr algn="ctr"/>
+            <a:r>
+              <a:rPr lang="es-ES_tradnl" dirty="0"/>
+              <a:t>Modelo fenomenológico</a:t>
+            </a:r>
+          </a:p>
+        </p:txBody>
+      </p:sp>
+      <p:cxnSp>
+        <p:nvCxnSpPr>
+          <p:cNvPr id="10" name="Straight Arrow Connector 9">
+            <a:extLst>
+              <a:ext uri="{FF2B5EF4-FFF2-40B4-BE49-F238E27FC236}">
+                <a16:creationId xmlns:a16="http://schemas.microsoft.com/office/drawing/2014/main" id="{379CDCD6-8C2C-F9D7-C299-6D67E1E59AB6}"/>
+              </a:ext>
+            </a:extLst>
+          </p:cNvPr>
+          <p:cNvCxnSpPr/>
+          <p:nvPr/>
+        </p:nvCxnSpPr>
+        <p:spPr>
+          <a:xfrm>
+            <a:off x="3490675" y="2967336"/>
+            <a:ext cx="395600" cy="0"/>
+          </a:xfrm>
+          <a:prstGeom prst="straightConnector1">
+            <a:avLst/>
+          </a:prstGeom>
+          <a:ln>
+            <a:tailEnd type="triangle"/>
+          </a:ln>
+        </p:spPr>
+        <p:style>
+          <a:lnRef idx="3">
+            <a:schemeClr val="dk1"/>
+          </a:lnRef>
+          <a:fillRef idx="0">
+            <a:schemeClr val="dk1"/>
+          </a:fillRef>
+          <a:effectRef idx="2">
+            <a:schemeClr val="dk1"/>
+          </a:effectRef>
+          <a:fontRef idx="minor">
+            <a:schemeClr val="tx1"/>
+          </a:fontRef>
+        </p:style>
+      </p:cxnSp>
+      <p:sp>
+        <p:nvSpPr>
+          <p:cNvPr id="11" name="TextBox 10">
+            <a:extLst>
+              <a:ext uri="{FF2B5EF4-FFF2-40B4-BE49-F238E27FC236}">
+                <a16:creationId xmlns:a16="http://schemas.microsoft.com/office/drawing/2014/main" id="{98DFE4FB-A362-9867-8B07-6D2806F22FB9}"/>
+              </a:ext>
+            </a:extLst>
+          </p:cNvPr>
+          <p:cNvSpPr txBox="1"/>
+          <p:nvPr/>
+        </p:nvSpPr>
+        <p:spPr>
+          <a:xfrm>
+            <a:off x="3886275" y="2644170"/>
+            <a:ext cx="1991033" cy="646331"/>
+          </a:xfrm>
+          <a:prstGeom prst="rect">
+            <a:avLst/>
+          </a:prstGeom>
+          <a:noFill/>
+          <a:ln>
+            <a:solidFill>
+              <a:schemeClr val="tx1"/>
+            </a:solidFill>
+          </a:ln>
+        </p:spPr>
+        <p:txBody>
+          <a:bodyPr wrap="square" rtlCol="0">
+            <a:spAutoFit/>
+          </a:bodyPr>
+          <a:lstStyle/>
+          <a:p>
+            <a:pPr algn="ctr"/>
+            <a:r>
+              <a:rPr lang="es-ES_tradnl" dirty="0"/>
+              <a:t>Algoritmo de Deep learning </a:t>
+            </a:r>
+          </a:p>
+        </p:txBody>
+      </p:sp>
+      <p:sp>
+        <p:nvSpPr>
+          <p:cNvPr id="12" name="TextBox 11">
+            <a:extLst>
+              <a:ext uri="{FF2B5EF4-FFF2-40B4-BE49-F238E27FC236}">
+                <a16:creationId xmlns:a16="http://schemas.microsoft.com/office/drawing/2014/main" id="{A5947AF4-EF80-219A-3664-6F55CE5E899A}"/>
+              </a:ext>
+            </a:extLst>
+          </p:cNvPr>
+          <p:cNvSpPr txBox="1"/>
+          <p:nvPr/>
+        </p:nvSpPr>
+        <p:spPr>
+          <a:xfrm>
+            <a:off x="6272908" y="2505670"/>
+            <a:ext cx="1715845" cy="923330"/>
+          </a:xfrm>
+          <a:prstGeom prst="rect">
+            <a:avLst/>
+          </a:prstGeom>
+          <a:noFill/>
+          <a:ln>
+            <a:solidFill>
+              <a:schemeClr val="tx1"/>
+            </a:solidFill>
+          </a:ln>
+        </p:spPr>
+        <p:txBody>
+          <a:bodyPr wrap="square" rtlCol="0">
+            <a:spAutoFit/>
+          </a:bodyPr>
+          <a:lstStyle/>
+          <a:p>
+            <a:pPr algn="ctr"/>
+            <a:r>
+              <a:rPr lang="es-ES_tradnl" dirty="0"/>
+              <a:t>Predicción de caracterización de un material</a:t>
+            </a:r>
+          </a:p>
+        </p:txBody>
+      </p:sp>
+      <p:cxnSp>
+        <p:nvCxnSpPr>
+          <p:cNvPr id="13" name="Straight Arrow Connector 12">
+            <a:extLst>
+              <a:ext uri="{FF2B5EF4-FFF2-40B4-BE49-F238E27FC236}">
+                <a16:creationId xmlns:a16="http://schemas.microsoft.com/office/drawing/2014/main" id="{A2DB95E6-D6CA-E83B-AC6F-ACC395CB99DC}"/>
+              </a:ext>
+            </a:extLst>
+          </p:cNvPr>
+          <p:cNvCxnSpPr/>
+          <p:nvPr/>
+        </p:nvCxnSpPr>
+        <p:spPr>
+          <a:xfrm>
+            <a:off x="5877308" y="2971839"/>
+            <a:ext cx="395600" cy="0"/>
+          </a:xfrm>
+          <a:prstGeom prst="straightConnector1">
+            <a:avLst/>
+          </a:prstGeom>
+          <a:ln>
+            <a:tailEnd type="triangle"/>
+          </a:ln>
+        </p:spPr>
+        <p:style>
+          <a:lnRef idx="3">
+            <a:schemeClr val="dk1"/>
+          </a:lnRef>
+          <a:fillRef idx="0">
+            <a:schemeClr val="dk1"/>
+          </a:fillRef>
+          <a:effectRef idx="2">
+            <a:schemeClr val="dk1"/>
+          </a:effectRef>
+          <a:fontRef idx="minor">
+            <a:schemeClr val="tx1"/>
+          </a:fontRef>
+        </p:style>
+      </p:cxnSp>
+      <p:sp>
+        <p:nvSpPr>
+          <p:cNvPr id="14" name="TextBox 13">
+            <a:extLst>
+              <a:ext uri="{FF2B5EF4-FFF2-40B4-BE49-F238E27FC236}">
+                <a16:creationId xmlns:a16="http://schemas.microsoft.com/office/drawing/2014/main" id="{D65A8CBC-2A96-059B-29D7-CF2B60E6B3C0}"/>
+              </a:ext>
+            </a:extLst>
+          </p:cNvPr>
+          <p:cNvSpPr txBox="1"/>
+          <p:nvPr/>
+        </p:nvSpPr>
+        <p:spPr>
+          <a:xfrm>
+            <a:off x="8384353" y="2505670"/>
+            <a:ext cx="2263982" cy="923330"/>
+          </a:xfrm>
+          <a:prstGeom prst="rect">
+            <a:avLst/>
+          </a:prstGeom>
+          <a:noFill/>
+          <a:ln>
+            <a:solidFill>
+              <a:schemeClr val="tx1"/>
+            </a:solidFill>
+          </a:ln>
+        </p:spPr>
+        <p:txBody>
+          <a:bodyPr wrap="square" rtlCol="0">
+            <a:spAutoFit/>
+          </a:bodyPr>
+          <a:lstStyle/>
+          <a:p>
+            <a:pPr algn="ctr"/>
+            <a:r>
+              <a:rPr lang="es-ES_tradnl" dirty="0"/>
+              <a:t>Comparación contra método tradicional y bayesiano</a:t>
+            </a:r>
+          </a:p>
+        </p:txBody>
+      </p:sp>
+      <p:cxnSp>
+        <p:nvCxnSpPr>
+          <p:cNvPr id="15" name="Straight Arrow Connector 14">
+            <a:extLst>
+              <a:ext uri="{FF2B5EF4-FFF2-40B4-BE49-F238E27FC236}">
+                <a16:creationId xmlns:a16="http://schemas.microsoft.com/office/drawing/2014/main" id="{CB81B180-0FC5-BE96-834D-A7BAAC666B2E}"/>
+              </a:ext>
+            </a:extLst>
+          </p:cNvPr>
+          <p:cNvCxnSpPr/>
+          <p:nvPr/>
+        </p:nvCxnSpPr>
+        <p:spPr>
+          <a:xfrm>
+            <a:off x="7988753" y="2967335"/>
+            <a:ext cx="395600" cy="0"/>
+          </a:xfrm>
+          <a:prstGeom prst="straightConnector1">
+            <a:avLst/>
+          </a:prstGeom>
+          <a:ln>
+            <a:tailEnd type="triangle"/>
+          </a:ln>
+        </p:spPr>
+        <p:style>
+          <a:lnRef idx="3">
+            <a:schemeClr val="dk1"/>
+          </a:lnRef>
+          <a:fillRef idx="0">
+            <a:schemeClr val="dk1"/>
+          </a:fillRef>
+          <a:effectRef idx="2">
+            <a:schemeClr val="dk1"/>
+          </a:effectRef>
+          <a:fontRef idx="minor">
+            <a:schemeClr val="tx1"/>
+          </a:fontRef>
+        </p:style>
+      </p:cxnSp>
+      <p:pic>
+        <p:nvPicPr>
+          <p:cNvPr id="17" name="Picture 16" descr="A picture containing icon&#10;&#10;Description automatically generated">
+            <a:extLst>
+              <a:ext uri="{FF2B5EF4-FFF2-40B4-BE49-F238E27FC236}">
+                <a16:creationId xmlns:a16="http://schemas.microsoft.com/office/drawing/2014/main" id="{8C2A957A-A2CE-A2CE-1CD6-5A628F6B686E}"/>
+              </a:ext>
+            </a:extLst>
+          </p:cNvPr>
+          <p:cNvPicPr>
+            <a:picLocks noChangeAspect="1"/>
+          </p:cNvPicPr>
+          <p:nvPr/>
+        </p:nvPicPr>
+        <p:blipFill>
+          <a:blip r:embed="rId2"/>
+          <a:stretch>
+            <a:fillRect/>
+          </a:stretch>
+        </p:blipFill>
+        <p:spPr>
+          <a:xfrm>
+            <a:off x="4570642" y="2126514"/>
+            <a:ext cx="622300" cy="419100"/>
+          </a:xfrm>
+          <a:prstGeom prst="rect">
+            <a:avLst/>
+          </a:prstGeom>
+        </p:spPr>
+      </p:pic>
+      <p:cxnSp>
+        <p:nvCxnSpPr>
+          <p:cNvPr id="18" name="Straight Arrow Connector 17">
+            <a:extLst>
+              <a:ext uri="{FF2B5EF4-FFF2-40B4-BE49-F238E27FC236}">
+                <a16:creationId xmlns:a16="http://schemas.microsoft.com/office/drawing/2014/main" id="{B8BAFF25-748B-EACC-6564-86452145CB3C}"/>
+              </a:ext>
+            </a:extLst>
+          </p:cNvPr>
+          <p:cNvCxnSpPr>
+            <a:cxnSpLocks/>
+          </p:cNvCxnSpPr>
+          <p:nvPr/>
+        </p:nvCxnSpPr>
+        <p:spPr>
+          <a:xfrm flipV="1">
+            <a:off x="4881791" y="3290501"/>
+            <a:ext cx="0" cy="433467"/>
+          </a:xfrm>
+          <a:prstGeom prst="straightConnector1">
+            <a:avLst/>
+          </a:prstGeom>
+          <a:ln>
+            <a:tailEnd type="triangle"/>
+          </a:ln>
+        </p:spPr>
+        <p:style>
+          <a:lnRef idx="3">
+            <a:schemeClr val="dk1"/>
+          </a:lnRef>
+          <a:fillRef idx="0">
+            <a:schemeClr val="dk1"/>
+          </a:fillRef>
+          <a:effectRef idx="2">
+            <a:schemeClr val="dk1"/>
+          </a:effectRef>
+          <a:fontRef idx="minor">
+            <a:schemeClr val="tx1"/>
+          </a:fontRef>
+        </p:style>
+      </p:cxnSp>
+      <p:cxnSp>
+        <p:nvCxnSpPr>
+          <p:cNvPr id="22" name="Straight Connector 21">
+            <a:extLst>
+              <a:ext uri="{FF2B5EF4-FFF2-40B4-BE49-F238E27FC236}">
+                <a16:creationId xmlns:a16="http://schemas.microsoft.com/office/drawing/2014/main" id="{B7FEA1C4-0681-F627-3B93-87785ABB37E6}"/>
+              </a:ext>
+            </a:extLst>
+          </p:cNvPr>
+          <p:cNvCxnSpPr/>
+          <p:nvPr/>
+        </p:nvCxnSpPr>
+        <p:spPr>
+          <a:xfrm>
+            <a:off x="4881791" y="3723968"/>
+            <a:ext cx="4634553" cy="0"/>
+          </a:xfrm>
+          <a:prstGeom prst="line">
+            <a:avLst/>
+          </a:prstGeom>
+        </p:spPr>
+        <p:style>
+          <a:lnRef idx="3">
+            <a:schemeClr val="dk1"/>
+          </a:lnRef>
+          <a:fillRef idx="0">
+            <a:schemeClr val="dk1"/>
+          </a:fillRef>
+          <a:effectRef idx="2">
+            <a:schemeClr val="dk1"/>
+          </a:effectRef>
+          <a:fontRef idx="minor">
+            <a:schemeClr val="tx1"/>
+          </a:fontRef>
+        </p:style>
+      </p:cxnSp>
+      <p:cxnSp>
+        <p:nvCxnSpPr>
+          <p:cNvPr id="23" name="Straight Connector 22">
+            <a:extLst>
+              <a:ext uri="{FF2B5EF4-FFF2-40B4-BE49-F238E27FC236}">
+                <a16:creationId xmlns:a16="http://schemas.microsoft.com/office/drawing/2014/main" id="{37C81810-232B-2B07-1F25-CF673A4B78EA}"/>
+              </a:ext>
+            </a:extLst>
+          </p:cNvPr>
+          <p:cNvCxnSpPr>
+            <a:cxnSpLocks/>
+          </p:cNvCxnSpPr>
+          <p:nvPr/>
+        </p:nvCxnSpPr>
+        <p:spPr>
+          <a:xfrm>
+            <a:off x="9516344" y="3429000"/>
+            <a:ext cx="0" cy="294968"/>
+          </a:xfrm>
+          <a:prstGeom prst="line">
+            <a:avLst/>
+          </a:prstGeom>
+        </p:spPr>
+        <p:style>
+          <a:lnRef idx="3">
+            <a:schemeClr val="dk1"/>
+          </a:lnRef>
+          <a:fillRef idx="0">
+            <a:schemeClr val="dk1"/>
+          </a:fillRef>
+          <a:effectRef idx="2">
+            <a:schemeClr val="dk1"/>
+          </a:effectRef>
+          <a:fontRef idx="minor">
+            <a:schemeClr val="tx1"/>
+          </a:fontRef>
+        </p:style>
+      </p:cxnSp>
+      <mc:AlternateContent xmlns:mc="http://schemas.openxmlformats.org/markup-compatibility/2006">
+        <mc:Choice xmlns:a14="http://schemas.microsoft.com/office/drawing/2010/main" Requires="a14">
+          <p:sp>
+            <p:nvSpPr>
+              <p:cNvPr id="27" name="TextBox 26">
+                <a:extLst>
+                  <a:ext uri="{FF2B5EF4-FFF2-40B4-BE49-F238E27FC236}">
+                    <a16:creationId xmlns:a16="http://schemas.microsoft.com/office/drawing/2014/main" id="{2A21D246-431A-ECC4-AF47-F4DF7103EAFA}"/>
+                  </a:ext>
+                </a:extLst>
+              </p:cNvPr>
+              <p:cNvSpPr txBox="1"/>
+              <p:nvPr/>
+            </p:nvSpPr>
+            <p:spPr>
+              <a:xfrm>
+                <a:off x="6694139" y="2097841"/>
+                <a:ext cx="873381" cy="276999"/>
+              </a:xfrm>
+              <a:prstGeom prst="rect">
+                <a:avLst/>
+              </a:prstGeom>
+              <a:noFill/>
+            </p:spPr>
+            <p:txBody>
+              <a:bodyPr wrap="none" lIns="0" tIns="0" rIns="0" bIns="0" rtlCol="0">
+                <a:spAutoFit/>
+              </a:bodyPr>
+              <a:lstStyle/>
+              <a:p>
+                <a14:m>
+                  <m:oMathPara xmlns:m="http://schemas.openxmlformats.org/officeDocument/2006/math">
+                    <m:oMathParaPr>
+                      <m:jc m:val="centerGroup"/>
+                    </m:oMathParaPr>
+                    <m:oMath xmlns:m="http://schemas.openxmlformats.org/officeDocument/2006/math">
+                      <m:r>
+                        <a:rPr lang="en-US" b="0" i="1" smtClean="0">
+                          <a:latin typeface="Cambria Math" panose="02040503050406030204" pitchFamily="18" charset="0"/>
+                          <a:ea typeface="Cambria Math" panose="02040503050406030204" pitchFamily="18" charset="0"/>
+                        </a:rPr>
+                        <m:t> </m:t>
+                      </m:r>
+                      <m:r>
+                        <a:rPr lang="en-US" b="0" i="1" smtClean="0">
+                          <a:latin typeface="Cambria Math" panose="02040503050406030204" pitchFamily="18" charset="0"/>
+                          <a:ea typeface="Cambria Math" panose="02040503050406030204" pitchFamily="18" charset="0"/>
+                        </a:rPr>
+                        <m:t>𝜀</m:t>
+                      </m:r>
+                      <m:r>
+                        <a:rPr lang="en-US" b="0" i="1" smtClean="0">
+                          <a:latin typeface="Cambria Math" panose="02040503050406030204" pitchFamily="18" charset="0"/>
+                          <a:ea typeface="Cambria Math" panose="02040503050406030204" pitchFamily="18" charset="0"/>
+                        </a:rPr>
+                        <m:t>,</m:t>
+                      </m:r>
+                      <m:r>
+                        <a:rPr lang="en-AR" i="1" smtClean="0">
+                          <a:latin typeface="Cambria Math" panose="02040503050406030204" pitchFamily="18" charset="0"/>
+                          <a:ea typeface="Cambria Math" panose="02040503050406030204" pitchFamily="18" charset="0"/>
+                        </a:rPr>
+                        <m:t>𝜌</m:t>
+                      </m:r>
+                      <m:r>
+                        <a:rPr lang="en-US" b="0" i="1" smtClean="0">
+                          <a:latin typeface="Cambria Math" panose="02040503050406030204" pitchFamily="18" charset="0"/>
+                          <a:ea typeface="Cambria Math" panose="02040503050406030204" pitchFamily="18" charset="0"/>
+                        </a:rPr>
+                        <m:t>, </m:t>
+                      </m:r>
+                      <m:r>
+                        <a:rPr lang="en-US" b="0" i="1" smtClean="0">
+                          <a:latin typeface="Cambria Math" panose="02040503050406030204" pitchFamily="18" charset="0"/>
+                          <a:ea typeface="Cambria Math" panose="02040503050406030204" pitchFamily="18" charset="0"/>
+                        </a:rPr>
+                        <m:t>𝜎</m:t>
+                      </m:r>
+                      <m:r>
+                        <a:rPr lang="en-US" b="0" i="1" smtClean="0">
+                          <a:latin typeface="Cambria Math" panose="02040503050406030204" pitchFamily="18" charset="0"/>
+                          <a:ea typeface="Cambria Math" panose="02040503050406030204" pitchFamily="18" charset="0"/>
+                        </a:rPr>
+                        <m:t>, </m:t>
+                      </m:r>
+                      <m:r>
+                        <m:rPr>
+                          <m:sty m:val="p"/>
+                        </m:rPr>
+                        <a:rPr lang="el-GR" b="0" i="1" smtClean="0">
+                          <a:latin typeface="Cambria Math" panose="02040503050406030204" pitchFamily="18" charset="0"/>
+                          <a:ea typeface="Cambria Math" panose="02040503050406030204" pitchFamily="18" charset="0"/>
+                        </a:rPr>
+                        <m:t>Ζ</m:t>
+                      </m:r>
+                    </m:oMath>
+                  </m:oMathPara>
+                </a14:m>
+                <a:endParaRPr lang="en-AR" dirty="0"/>
+              </a:p>
+            </p:txBody>
+          </p:sp>
+        </mc:Choice>
+        <mc:Fallback>
+          <p:sp>
+            <p:nvSpPr>
+              <p:cNvPr id="27" name="TextBox 26">
+                <a:extLst>
+                  <a:ext uri="{FF2B5EF4-FFF2-40B4-BE49-F238E27FC236}">
+                    <a16:creationId xmlns:a16="http://schemas.microsoft.com/office/drawing/2014/main" id="{2A21D246-431A-ECC4-AF47-F4DF7103EAFA}"/>
+                  </a:ext>
+                </a:extLst>
+              </p:cNvPr>
+              <p:cNvSpPr txBox="1">
+                <a:spLocks noRot="1" noChangeAspect="1" noMove="1" noResize="1" noEditPoints="1" noAdjustHandles="1" noChangeArrowheads="1" noChangeShapeType="1" noTextEdit="1"/>
+              </p:cNvSpPr>
+              <p:nvPr/>
+            </p:nvSpPr>
+            <p:spPr>
+              <a:xfrm>
+                <a:off x="6694139" y="2097841"/>
+                <a:ext cx="873381" cy="276999"/>
+              </a:xfrm>
+              <a:prstGeom prst="rect">
+                <a:avLst/>
+              </a:prstGeom>
+              <a:blipFill>
+                <a:blip r:embed="rId3"/>
+                <a:stretch>
+                  <a:fillRect l="-10145" t="-8696" r="-5797" b="-34783"/>
+                </a:stretch>
+              </a:blipFill>
+            </p:spPr>
+            <p:txBody>
+              <a:bodyPr/>
+              <a:lstStyle/>
+              <a:p>
+                <a:r>
+                  <a:rPr lang="en-AR">
+                    <a:noFill/>
+                  </a:rPr>
+                  <a:t> </a:t>
+                </a:r>
+              </a:p>
+            </p:txBody>
+          </p:sp>
+        </mc:Fallback>
+      </mc:AlternateContent>
+      <p:pic>
+        <p:nvPicPr>
+          <p:cNvPr id="29" name="Picture 28" descr="Icon&#10;&#10;Description automatically generated">
+            <a:extLst>
+              <a:ext uri="{FF2B5EF4-FFF2-40B4-BE49-F238E27FC236}">
+                <a16:creationId xmlns:a16="http://schemas.microsoft.com/office/drawing/2014/main" id="{92870E7F-2949-0B08-B790-0797AB48C289}"/>
+              </a:ext>
+            </a:extLst>
+          </p:cNvPr>
+          <p:cNvPicPr>
+            <a:picLocks noChangeAspect="1"/>
+          </p:cNvPicPr>
+          <p:nvPr/>
+        </p:nvPicPr>
+        <p:blipFill>
+          <a:blip r:embed="rId4"/>
+          <a:stretch>
+            <a:fillRect/>
+          </a:stretch>
+        </p:blipFill>
+        <p:spPr>
+          <a:xfrm>
+            <a:off x="9300444" y="2033140"/>
+            <a:ext cx="431800" cy="406400"/>
+          </a:xfrm>
+          <a:prstGeom prst="rect">
+            <a:avLst/>
+          </a:prstGeom>
+        </p:spPr>
+      </p:pic>
+    </p:spTree>
+    <p:extLst>
+      <p:ext uri="{BB962C8B-B14F-4D97-AF65-F5344CB8AC3E}">
+        <p14:creationId xmlns:p14="http://schemas.microsoft.com/office/powerpoint/2010/main" val="1880207999"/>
       </p:ext>
     </p:extLst>
   </p:cSld>

</xml_diff>